<commit_message>
Update file description files for Multidimensional Arrays
</commit_message>
<xml_diff>
--- a/SoftUni/Java/Java Advanced/02. Multidimensional Arrays/02. Java-Advanced-Multidimensional-Arrays.pptx
+++ b/SoftUni/Java/Java Advanced/02. Multidimensional Arrays/02. Java-Advanced-Multidimensional-Arrays.pptx
@@ -303,7 +303,7 @@
           <a:p>
             <a:fld id="{4E087215-0C8F-4762-A664-737A353EC9A4}" type="datetimeFigureOut">
               <a:rPr lang="bg-BG" smtClean="0"/>
-              <a:t>8.9.2022 г.</a:t>
+              <a:t>19.12.2022 г.</a:t>
             </a:fld>
             <a:endParaRPr lang="bg-BG"/>
           </a:p>
@@ -494,7 +494,7 @@
           <a:p>
             <a:fld id="{72D84649-876A-46C9-8472-14CB09C070D8}" type="datetimeFigureOut">
               <a:rPr lang="en-US" smtClean="0"/>
-              <a:t>9/8/2022</a:t>
+              <a:t>12/19/2022</a:t>
             </a:fld>
             <a:endParaRPr lang="en-US"/>
           </a:p>
@@ -11184,7 +11184,7 @@
         </p:nvSpPr>
         <p:spPr bwMode="auto">
           <a:xfrm>
-            <a:off x="684212" y="1931313"/>
+            <a:off x="729212" y="1931313"/>
             <a:ext cx="8506442" cy="461665"/>
           </a:xfrm>
           <a:prstGeom prst="rect">
@@ -11326,7 +11326,7 @@
         </p:nvSpPr>
         <p:spPr bwMode="auto">
           <a:xfrm>
-            <a:off x="684212" y="3200400"/>
+            <a:off x="729212" y="3200400"/>
             <a:ext cx="8561788" cy="830997"/>
           </a:xfrm>
           <a:prstGeom prst="rect">
@@ -11457,7 +11457,7 @@
         </p:nvSpPr>
         <p:spPr bwMode="auto">
           <a:xfrm>
-            <a:off x="684212" y="4800600"/>
+            <a:off x="729212" y="4800600"/>
             <a:ext cx="8506442" cy="1569660"/>
           </a:xfrm>
           <a:prstGeom prst="rect">
@@ -13492,7 +13492,7 @@
           <p:nvPr>
             <p:extLst>
               <p:ext uri="{D42A27DB-BD31-4B8C-83A1-F6EECF244321}">
-                <p14:modId xmlns:p14="http://schemas.microsoft.com/office/powerpoint/2010/main" val="338363068"/>
+                <p14:modId xmlns:p14="http://schemas.microsoft.com/office/powerpoint/2010/main" val="650627546"/>
               </p:ext>
             </p:extLst>
           </p:nvPr>
@@ -23105,11 +23105,11 @@
       </p:sp>
       <p:pic>
         <p:nvPicPr>
-          <p:cNvPr id="17" name="Picture 16" descr="Graphical user interface, text, application&#10;&#10;Description automatically generated">
+          <p:cNvPr id="19" name="Picture 18" descr="Logo, company name&#10;&#10;Description automatically generated">
             <a:hlinkClick r:id="rId2"/>
             <a:extLst>
               <a:ext uri="{FF2B5EF4-FFF2-40B4-BE49-F238E27FC236}">
-                <a16:creationId xmlns:a16="http://schemas.microsoft.com/office/drawing/2014/main" id="{817217D7-0BF6-4D9E-8E3B-E4C13EC5C3A5}"/>
+                <a16:creationId xmlns:a16="http://schemas.microsoft.com/office/drawing/2014/main" id="{F695C7C5-DABF-43EE-A6C1-EAE2EEE0C90E}"/>
               </a:ext>
             </a:extLst>
           </p:cNvPr>
@@ -23126,13 +23126,13 @@
               </a:ext>
             </a:extLst>
           </a:blip>
-          <a:srcRect l="8432" t="2384" r="19064" b="23051"/>
+          <a:srcRect l="15754" t="27513" r="15212" b="31480"/>
           <a:stretch/>
         </p:blipFill>
         <p:spPr>
           <a:xfrm>
-            <a:off x="349673" y="2849671"/>
-            <a:ext cx="2217855" cy="1092173"/>
+            <a:off x="277587" y="5655568"/>
+            <a:ext cx="1704391" cy="759297"/>
           </a:xfrm>
           <a:prstGeom prst="rect">
             <a:avLst/>
@@ -23141,11 +23141,11 @@
       </p:pic>
       <p:pic>
         <p:nvPicPr>
-          <p:cNvPr id="20" name="Picture 19" descr="Text&#10;&#10;Description automatically generated with low confidence">
+          <p:cNvPr id="23" name="Picture 22" descr="A picture containing logo&#10;&#10;Description automatically generated">
             <a:hlinkClick r:id="rId4"/>
             <a:extLst>
               <a:ext uri="{FF2B5EF4-FFF2-40B4-BE49-F238E27FC236}">
-                <a16:creationId xmlns:a16="http://schemas.microsoft.com/office/drawing/2014/main" id="{04A6A894-8A9A-4E5B-88D1-24F9A2F84830}"/>
+                <a16:creationId xmlns:a16="http://schemas.microsoft.com/office/drawing/2014/main" id="{BA25B75E-8216-4248-83D3-EC26438E34CB}"/>
               </a:ext>
             </a:extLst>
           </p:cNvPr>
@@ -23168,8 +23168,8 @@
         </p:blipFill>
         <p:spPr>
           <a:xfrm>
-            <a:off x="7002460" y="2356669"/>
-            <a:ext cx="2089504" cy="1639964"/>
+            <a:off x="9535193" y="5558957"/>
+            <a:ext cx="1593799" cy="952521"/>
           </a:xfrm>
           <a:prstGeom prst="rect">
             <a:avLst/>
@@ -23178,11 +23178,11 @@
       </p:pic>
       <p:pic>
         <p:nvPicPr>
-          <p:cNvPr id="25" name="Picture 24" descr="Graphical user interface&#10;&#10;Description automatically generated with low confidence">
+          <p:cNvPr id="24" name="Picture 23" descr="Graphical user interface, text, application&#10;&#10;Description automatically generated">
             <a:hlinkClick r:id="rId6"/>
             <a:extLst>
               <a:ext uri="{FF2B5EF4-FFF2-40B4-BE49-F238E27FC236}">
-                <a16:creationId xmlns:a16="http://schemas.microsoft.com/office/drawing/2014/main" id="{83257898-7623-4DC1-92DC-C5AD2AC74CFA}"/>
+                <a16:creationId xmlns:a16="http://schemas.microsoft.com/office/drawing/2014/main" id="{99BE8E0D-4CD6-423C-B482-4BF691E004B9}"/>
               </a:ext>
             </a:extLst>
           </p:cNvPr>
@@ -23191,7 +23191,7 @@
           </p:cNvPicPr>
           <p:nvPr/>
         </p:nvPicPr>
-        <p:blipFill>
+        <p:blipFill rotWithShape="1">
           <a:blip r:embed="rId7">
             <a:extLst>
               <a:ext uri="{28A0092B-C50C-407E-A947-70E740481C1C}">
@@ -23199,14 +23199,13 @@
               </a:ext>
             </a:extLst>
           </a:blip>
-          <a:stretch>
-            <a:fillRect/>
-          </a:stretch>
+          <a:srcRect l="8432" t="2384" r="19064" b="23051"/>
+          <a:stretch/>
         </p:blipFill>
         <p:spPr>
           <a:xfrm>
-            <a:off x="9653126" y="1687971"/>
-            <a:ext cx="2045805" cy="2515334"/>
+            <a:off x="2735348" y="2557422"/>
+            <a:ext cx="2211823" cy="1089203"/>
           </a:xfrm>
           <a:prstGeom prst="rect">
             <a:avLst/>
@@ -23215,11 +23214,11 @@
       </p:pic>
       <p:pic>
         <p:nvPicPr>
-          <p:cNvPr id="27" name="Picture 26" descr="Logo&#10;&#10;Description automatically generated with low confidence">
+          <p:cNvPr id="26" name="Picture 25" descr="Logo&#10;&#10;Description automatically generated">
             <a:hlinkClick r:id="rId8"/>
             <a:extLst>
               <a:ext uri="{FF2B5EF4-FFF2-40B4-BE49-F238E27FC236}">
-                <a16:creationId xmlns:a16="http://schemas.microsoft.com/office/drawing/2014/main" id="{C179D76D-17E7-4F4E-9808-BBF903658DA6}"/>
+                <a16:creationId xmlns:a16="http://schemas.microsoft.com/office/drawing/2014/main" id="{3A1E1CA1-D56C-4DE1-9BDC-F2FA10D0931A}"/>
               </a:ext>
             </a:extLst>
           </p:cNvPr>
@@ -23242,8 +23241,8 @@
         </p:blipFill>
         <p:spPr>
           <a:xfrm>
-            <a:off x="3445561" y="1597174"/>
-            <a:ext cx="5116914" cy="876716"/>
+            <a:off x="103821" y="4194384"/>
+            <a:ext cx="2366037" cy="1025101"/>
           </a:xfrm>
           <a:prstGeom prst="rect">
             <a:avLst/>
@@ -23252,11 +23251,11 @@
       </p:pic>
       <p:pic>
         <p:nvPicPr>
-          <p:cNvPr id="30" name="Picture 29" descr="Logo&#10;&#10;Description automatically generated">
+          <p:cNvPr id="29" name="Picture 28" descr="Text&#10;&#10;Description automatically generated with low confidence">
             <a:hlinkClick r:id="rId10"/>
             <a:extLst>
               <a:ext uri="{FF2B5EF4-FFF2-40B4-BE49-F238E27FC236}">
-                <a16:creationId xmlns:a16="http://schemas.microsoft.com/office/drawing/2014/main" id="{93F033DD-94F4-4599-9D64-B6A8BF46466B}"/>
+                <a16:creationId xmlns:a16="http://schemas.microsoft.com/office/drawing/2014/main" id="{7E770D87-9E84-428A-B6DE-60CA6A95A965}"/>
               </a:ext>
             </a:extLst>
           </p:cNvPr>
@@ -23279,8 +23278,8 @@
         </p:blipFill>
         <p:spPr>
           <a:xfrm>
-            <a:off x="493069" y="1238971"/>
-            <a:ext cx="1824182" cy="1276927"/>
+            <a:off x="2721161" y="875362"/>
+            <a:ext cx="2184284" cy="1714353"/>
           </a:xfrm>
           <a:prstGeom prst="rect">
             <a:avLst/>
@@ -23289,11 +23288,11 @@
       </p:pic>
       <p:pic>
         <p:nvPicPr>
-          <p:cNvPr id="22" name="Picture 21" descr="Text&#10;&#10;Description automatically generated with low confidence">
+          <p:cNvPr id="34" name="Picture 33" descr="A picture containing logo&#10;&#10;Description automatically generated">
             <a:hlinkClick r:id="rId12"/>
             <a:extLst>
               <a:ext uri="{FF2B5EF4-FFF2-40B4-BE49-F238E27FC236}">
-                <a16:creationId xmlns:a16="http://schemas.microsoft.com/office/drawing/2014/main" id="{2D9A9160-CFB1-4198-B631-320EFBF99E2C}"/>
+                <a16:creationId xmlns:a16="http://schemas.microsoft.com/office/drawing/2014/main" id="{68388868-5056-476F-9288-137236A04225}"/>
               </a:ext>
             </a:extLst>
           </p:cNvPr>
@@ -23303,7 +23302,7 @@
           <p:nvPr/>
         </p:nvPicPr>
         <p:blipFill>
-          <a:blip r:embed="rId13" cstate="hqprint">
+          <a:blip r:embed="rId13">
             <a:extLst>
               <a:ext uri="{28A0092B-C50C-407E-A947-70E740481C1C}">
                 <a14:useLocalDpi xmlns:a14="http://schemas.microsoft.com/office/drawing/2010/main" val="0"/>
@@ -23316,8 +23315,8 @@
         </p:blipFill>
         <p:spPr>
           <a:xfrm>
-            <a:off x="6917811" y="4363706"/>
-            <a:ext cx="2376275" cy="535946"/>
+            <a:off x="6480500" y="5641819"/>
+            <a:ext cx="1815525" cy="869659"/>
           </a:xfrm>
           <a:prstGeom prst="rect">
             <a:avLst/>
@@ -23326,11 +23325,11 @@
       </p:pic>
       <p:pic>
         <p:nvPicPr>
-          <p:cNvPr id="21" name="Picture 20" descr="Logo, company name&#10;&#10;Description automatically generated">
+          <p:cNvPr id="35" name="Picture 34" descr="Logo&#10;&#10;Description automatically generated with low confidence">
             <a:hlinkClick r:id="rId14"/>
             <a:extLst>
               <a:ext uri="{FF2B5EF4-FFF2-40B4-BE49-F238E27FC236}">
-                <a16:creationId xmlns:a16="http://schemas.microsoft.com/office/drawing/2014/main" id="{B2C7AFA4-B03B-4F90-BCF5-42B64D45FD93}"/>
+                <a16:creationId xmlns:a16="http://schemas.microsoft.com/office/drawing/2014/main" id="{B87F00C9-0D0A-4D3E-82E8-9A2CFBB8B646}"/>
               </a:ext>
             </a:extLst>
           </p:cNvPr>
@@ -23339,7 +23338,7 @@
           </p:cNvPicPr>
           <p:nvPr/>
         </p:nvPicPr>
-        <p:blipFill rotWithShape="1">
+        <p:blipFill>
           <a:blip r:embed="rId15">
             <a:extLst>
               <a:ext uri="{28A0092B-C50C-407E-A947-70E740481C1C}">
@@ -23347,13 +23346,14 @@
               </a:ext>
             </a:extLst>
           </a:blip>
-          <a:srcRect l="15754" t="27513" r="15212" b="31480"/>
-          <a:stretch/>
+          <a:stretch>
+            <a:fillRect/>
+          </a:stretch>
         </p:blipFill>
         <p:spPr>
           <a:xfrm>
-            <a:off x="606404" y="5804742"/>
-            <a:ext cx="1704391" cy="759297"/>
+            <a:off x="5682336" y="1383106"/>
+            <a:ext cx="5236953" cy="965563"/>
           </a:xfrm>
           <a:prstGeom prst="rect">
             <a:avLst/>
@@ -23362,11 +23362,11 @@
       </p:pic>
       <p:pic>
         <p:nvPicPr>
-          <p:cNvPr id="28" name="Picture 27" descr="A picture containing logo&#10;&#10;Description automatically generated">
+          <p:cNvPr id="36" name="Picture 35" descr="Shape&#10;&#10;Description automatically generated with medium confidence">
             <a:hlinkClick r:id="rId16"/>
             <a:extLst>
               <a:ext uri="{FF2B5EF4-FFF2-40B4-BE49-F238E27FC236}">
-                <a16:creationId xmlns:a16="http://schemas.microsoft.com/office/drawing/2014/main" id="{8D7EE580-66D1-490E-AB52-9AAD1973ADFA}"/>
+                <a16:creationId xmlns:a16="http://schemas.microsoft.com/office/drawing/2014/main" id="{3B30853C-111E-4B36-8BEF-DFE3C6A84C5A}"/>
               </a:ext>
             </a:extLst>
           </p:cNvPr>
@@ -23389,8 +23389,8 @@
         </p:blipFill>
         <p:spPr>
           <a:xfrm>
-            <a:off x="687241" y="4327206"/>
-            <a:ext cx="1827471" cy="1092173"/>
+            <a:off x="2822761" y="5601521"/>
+            <a:ext cx="2520171" cy="869659"/>
           </a:xfrm>
           <a:prstGeom prst="rect">
             <a:avLst/>
@@ -23399,11 +23399,11 @@
       </p:pic>
       <p:pic>
         <p:nvPicPr>
-          <p:cNvPr id="31" name="Picture 30" descr="Logo&#10;&#10;Description automatically generated">
+          <p:cNvPr id="37" name="Picture 36" descr="Logo&#10;&#10;Description automatically generated">
             <a:hlinkClick r:id="rId18"/>
             <a:extLst>
               <a:ext uri="{FF2B5EF4-FFF2-40B4-BE49-F238E27FC236}">
-                <a16:creationId xmlns:a16="http://schemas.microsoft.com/office/drawing/2014/main" id="{51539337-EA92-4DEC-B27C-1C96A708D318}"/>
+                <a16:creationId xmlns:a16="http://schemas.microsoft.com/office/drawing/2014/main" id="{92837D2B-E933-480C-87FA-0B9DBAACA047}"/>
               </a:ext>
             </a:extLst>
           </p:cNvPr>
@@ -23426,8 +23426,8 @@
         </p:blipFill>
         <p:spPr>
           <a:xfrm>
-            <a:off x="2998515" y="2643494"/>
-            <a:ext cx="3631278" cy="1298350"/>
+            <a:off x="2563669" y="4086151"/>
+            <a:ext cx="2779263" cy="1075844"/>
           </a:xfrm>
           <a:prstGeom prst="rect">
             <a:avLst/>
@@ -23436,11 +23436,11 @@
       </p:pic>
       <p:pic>
         <p:nvPicPr>
-          <p:cNvPr id="32" name="Picture 31" descr="Logo&#10;&#10;Description automatically generated">
+          <p:cNvPr id="38" name="Picture 37" descr="Graphical user interface&#10;&#10;Description automatically generated with low confidence">
             <a:hlinkClick r:id="rId20"/>
             <a:extLst>
               <a:ext uri="{FF2B5EF4-FFF2-40B4-BE49-F238E27FC236}">
-                <a16:creationId xmlns:a16="http://schemas.microsoft.com/office/drawing/2014/main" id="{F70938FD-B0F5-423E-8C2C-99B884B6B04A}"/>
+                <a16:creationId xmlns:a16="http://schemas.microsoft.com/office/drawing/2014/main" id="{DF73092C-E471-4116-B890-7E2254703887}"/>
               </a:ext>
             </a:extLst>
           </p:cNvPr>
@@ -23463,8 +23463,8 @@
         </p:blipFill>
         <p:spPr>
           <a:xfrm>
-            <a:off x="6828735" y="5595629"/>
-            <a:ext cx="2657856" cy="916485"/>
+            <a:off x="306035" y="1476349"/>
+            <a:ext cx="1865077" cy="2314493"/>
           </a:xfrm>
           <a:prstGeom prst="rect">
             <a:avLst/>
@@ -23473,11 +23473,11 @@
       </p:pic>
       <p:pic>
         <p:nvPicPr>
-          <p:cNvPr id="33" name="Picture 32" descr="A picture containing logo&#10;&#10;Description automatically generated">
+          <p:cNvPr id="39" name="Picture 38" descr="Text&#10;&#10;Description automatically generated with low confidence">
             <a:hlinkClick r:id="rId22"/>
             <a:extLst>
               <a:ext uri="{FF2B5EF4-FFF2-40B4-BE49-F238E27FC236}">
-                <a16:creationId xmlns:a16="http://schemas.microsoft.com/office/drawing/2014/main" id="{FFB981A5-A282-4429-A0A1-AD728C389669}"/>
+                <a16:creationId xmlns:a16="http://schemas.microsoft.com/office/drawing/2014/main" id="{282CE06A-8307-4AAA-8AF5-197432017668}"/>
               </a:ext>
             </a:extLst>
           </p:cNvPr>
@@ -23487,7 +23487,7 @@
           <p:nvPr/>
         </p:nvPicPr>
         <p:blipFill>
-          <a:blip r:embed="rId23" cstate="hqprint">
+          <a:blip r:embed="rId23">
             <a:extLst>
               <a:ext uri="{28A0092B-C50C-407E-A947-70E740481C1C}">
                 <a14:useLocalDpi xmlns:a14="http://schemas.microsoft.com/office/drawing/2010/main" val="0"/>
@@ -23500,8 +23500,8 @@
         </p:blipFill>
         <p:spPr>
           <a:xfrm>
-            <a:off x="3520554" y="5519375"/>
-            <a:ext cx="2391414" cy="1145517"/>
+            <a:off x="6049177" y="4363431"/>
+            <a:ext cx="2757360" cy="621896"/>
           </a:xfrm>
           <a:prstGeom prst="rect">
             <a:avLst/>
@@ -23510,11 +23510,11 @@
       </p:pic>
       <p:pic>
         <p:nvPicPr>
-          <p:cNvPr id="15" name="Picture 14" descr="Shape&#10;&#10;Description automatically generated with medium confidence">
+          <p:cNvPr id="40" name="Picture 39" descr="Logo&#10;&#10;Description automatically generated">
             <a:hlinkClick r:id="rId24"/>
             <a:extLst>
               <a:ext uri="{FF2B5EF4-FFF2-40B4-BE49-F238E27FC236}">
-                <a16:creationId xmlns:a16="http://schemas.microsoft.com/office/drawing/2014/main" id="{C54AECE5-A7C3-4F84-941E-EDAA4DCD24A4}"/>
+                <a16:creationId xmlns:a16="http://schemas.microsoft.com/office/drawing/2014/main" id="{C1CA53F6-A2C4-4E43-8E82-B322807D5805}"/>
               </a:ext>
             </a:extLst>
           </p:cNvPr>
@@ -23537,8 +23537,8 @@
         </p:blipFill>
         <p:spPr>
           <a:xfrm>
-            <a:off x="3456176" y="4295780"/>
-            <a:ext cx="2520171" cy="869659"/>
+            <a:off x="9388945" y="3914016"/>
+            <a:ext cx="1740047" cy="1218032"/>
           </a:xfrm>
           <a:prstGeom prst="rect">
             <a:avLst/>
@@ -23547,11 +23547,11 @@
       </p:pic>
       <p:pic>
         <p:nvPicPr>
-          <p:cNvPr id="16" name="Picture 15" descr="Logo&#10;&#10;Description automatically generated">
+          <p:cNvPr id="41" name="Picture 40" descr="Logo&#10;&#10;Description automatically generated">
             <a:hlinkClick r:id="rId26"/>
             <a:extLst>
               <a:ext uri="{FF2B5EF4-FFF2-40B4-BE49-F238E27FC236}">
-                <a16:creationId xmlns:a16="http://schemas.microsoft.com/office/drawing/2014/main" id="{7760FE36-8EB1-4B6F-A56E-4FE01D75DFB9}"/>
+                <a16:creationId xmlns:a16="http://schemas.microsoft.com/office/drawing/2014/main" id="{A286012A-1A6D-4FD8-AF54-DE72F6FC3213}"/>
               </a:ext>
             </a:extLst>
           </p:cNvPr>
@@ -23574,8 +23574,45 @@
         </p:blipFill>
         <p:spPr>
           <a:xfrm>
-            <a:off x="9074598" y="4737801"/>
-            <a:ext cx="3202860" cy="1239817"/>
+            <a:off x="9472469" y="2542277"/>
+            <a:ext cx="1656523" cy="1104348"/>
+          </a:xfrm>
+          <a:prstGeom prst="rect">
+            <a:avLst/>
+          </a:prstGeom>
+        </p:spPr>
+      </p:pic>
+      <p:pic>
+        <p:nvPicPr>
+          <p:cNvPr id="42" name="Picture 41" descr="A blue and white logo&#10;&#10;Description automatically generated with medium confidence">
+            <a:hlinkClick r:id="rId28"/>
+            <a:extLst>
+              <a:ext uri="{FF2B5EF4-FFF2-40B4-BE49-F238E27FC236}">
+                <a16:creationId xmlns:a16="http://schemas.microsoft.com/office/drawing/2014/main" id="{B5A85CC1-6CE9-43CE-84E8-5F0D26AF4C9B}"/>
+              </a:ext>
+            </a:extLst>
+          </p:cNvPr>
+          <p:cNvPicPr>
+            <a:picLocks noChangeAspect="1"/>
+          </p:cNvPicPr>
+          <p:nvPr/>
+        </p:nvPicPr>
+        <p:blipFill>
+          <a:blip r:embed="rId29">
+            <a:extLst>
+              <a:ext uri="{28A0092B-C50C-407E-A947-70E740481C1C}">
+                <a14:useLocalDpi xmlns:a14="http://schemas.microsoft.com/office/drawing/2010/main" val="0"/>
+              </a:ext>
+            </a:extLst>
+          </a:blip>
+          <a:stretch>
+            <a:fillRect/>
+          </a:stretch>
+        </p:blipFill>
+        <p:spPr>
+          <a:xfrm>
+            <a:off x="5539855" y="2585651"/>
+            <a:ext cx="3396816" cy="947556"/>
           </a:xfrm>
           <a:prstGeom prst="rect">
             <a:avLst/>
@@ -23701,7 +23738,7 @@
         </p:blipFill>
         <p:spPr>
           <a:xfrm>
-            <a:off x="3908450" y="1883975"/>
+            <a:off x="4212532" y="2081770"/>
             <a:ext cx="3766935" cy="3521741"/>
           </a:xfrm>
           <a:prstGeom prst="rect">
@@ -26394,7 +26431,7 @@
         </p:nvSpPr>
         <p:spPr>
           <a:xfrm>
-            <a:off x="696002" y="1953904"/>
+            <a:off x="694922" y="1929847"/>
             <a:ext cx="8219822" cy="648997"/>
           </a:xfrm>
           <a:prstGeom prst="rect">
@@ -26635,7 +26672,7 @@
         </p:nvSpPr>
         <p:spPr>
           <a:xfrm>
-            <a:off x="696000" y="3511731"/>
+            <a:off x="694922" y="3454580"/>
             <a:ext cx="8219824" cy="1079884"/>
           </a:xfrm>
           <a:prstGeom prst="rect">
@@ -26878,7 +26915,7 @@
         </p:nvSpPr>
         <p:spPr>
           <a:xfrm>
-            <a:off x="696002" y="5410200"/>
+            <a:off x="694922" y="5410147"/>
             <a:ext cx="8219822" cy="1079884"/>
           </a:xfrm>
           <a:prstGeom prst="rect">
@@ -27295,7 +27332,7 @@
         </p:nvSpPr>
         <p:spPr bwMode="auto">
           <a:xfrm>
-            <a:off x="5651424" y="4181321"/>
+            <a:off x="5646000" y="4136830"/>
             <a:ext cx="3419224" cy="961676"/>
           </a:xfrm>
           <a:prstGeom prst="wedgeRoundRectCallout">
@@ -27843,13 +27880,13 @@
           <p:nvPr>
             <p:extLst>
               <p:ext uri="{D42A27DB-BD31-4B8C-83A1-F6EECF244321}">
-                <p14:modId xmlns:p14="http://schemas.microsoft.com/office/powerpoint/2010/main" val="3719936035"/>
+                <p14:modId xmlns:p14="http://schemas.microsoft.com/office/powerpoint/2010/main" val="4241472273"/>
               </p:ext>
             </p:extLst>
           </p:nvPr>
         </p:nvGraphicFramePr>
         <p:xfrm>
-          <a:off x="989012" y="3608438"/>
+          <a:off x="741000" y="3519000"/>
           <a:ext cx="6477000" cy="2792360"/>
         </p:xfrm>
         <a:graphic>
@@ -29295,7 +29332,7 @@
         </p:nvSpPr>
         <p:spPr bwMode="auto">
           <a:xfrm>
-            <a:off x="7619968" y="3915747"/>
+            <a:off x="7371956" y="3826309"/>
             <a:ext cx="2286000" cy="613562"/>
           </a:xfrm>
           <a:prstGeom prst="wedgeRoundRectCallout">
@@ -29392,7 +29429,7 @@
         </p:nvSpPr>
         <p:spPr bwMode="auto">
           <a:xfrm>
-            <a:off x="7619969" y="5004619"/>
+            <a:off x="7371957" y="4915181"/>
             <a:ext cx="2286000" cy="613562"/>
           </a:xfrm>
           <a:prstGeom prst="wedgeRoundRectCallout">
@@ -29929,7 +29966,7 @@
         </p:nvSpPr>
         <p:spPr bwMode="auto">
           <a:xfrm>
-            <a:off x="760414" y="1800469"/>
+            <a:off x="760414" y="1815607"/>
             <a:ext cx="8514215" cy="1388393"/>
           </a:xfrm>
           <a:prstGeom prst="rect">
@@ -30061,7 +30098,7 @@
         </p:nvSpPr>
         <p:spPr bwMode="auto">
           <a:xfrm>
-            <a:off x="760414" y="5181600"/>
+            <a:off x="760414" y="5267107"/>
             <a:ext cx="8514215" cy="1388393"/>
           </a:xfrm>
           <a:prstGeom prst="rect">

</xml_diff>